<commit_message>
updates to a few slides
</commit_message>
<xml_diff>
--- a/PowerPoints/13 - Subprograms.pptx
+++ b/PowerPoints/13 - Subprograms.pptx
@@ -28380,11 +28380,11 @@
           <a:p>
             <a:r>
               <a:rPr lang="en-US" dirty="0"/>
-              <a:t>Similar to what </a:t>
+              <a:t>Similar to what we </a:t>
             </a:r>
             <a:r>
               <a:rPr lang="en-US"/>
-              <a:t>we did for </a:t>
+              <a:t>did for </a:t>
             </a:r>
             <a:r>
               <a:rPr lang="en-US" dirty="0"/>
@@ -34645,10 +34645,16 @@
           <a:lstStyle/>
           <a:p>
             <a:r>
+              <a:rPr lang="en-US" sz="2250">
+                <a:latin typeface="Consolas" panose="020B0609020204030204" pitchFamily="49" charset="0"/>
+              </a:rPr>
+              <a:t>LDLADDR </a:t>
+            </a:r>
+            <a:r>
               <a:rPr lang="en-US" sz="2250" dirty="0">
                 <a:latin typeface="Consolas" panose="020B0609020204030204" pitchFamily="49" charset="0"/>
               </a:rPr>
-              <a:t>LDDADDR -12</a:t>
+              <a:t>-12</a:t>
             </a:r>
             <a:br>
               <a:rPr lang="en-US" sz="2250" dirty="0">

</xml_diff>